<commit_message>
Annadimos el powerPoint ?
</commit_message>
<xml_diff>
--- a/DocumentosMemeria/presentacionPowerPoint.pptx
+++ b/DocumentosMemeria/presentacionPowerPoint.pptx
@@ -5373,7 +5373,7 @@
         <p:spPr>
           <a:xfrm>
             <a:off x="684212" y="2987833"/>
-            <a:ext cx="6400800" cy="1947333"/>
+            <a:ext cx="7246808" cy="1947333"/>
           </a:xfrm>
         </p:spPr>
         <p:txBody>
@@ -5382,7 +5382,15 @@
           <a:p>
             <a:r>
               <a:rPr lang="en-US" dirty="0"/>
-              <a:t>Modulo de Proyecto</a:t>
+              <a:t>Modulo de Proyecto Desarrollo de </a:t>
+            </a:r>
+            <a:r>
+              <a:rPr lang="en-US" dirty="0" err="1"/>
+              <a:t>Aplicaciones</a:t>
+            </a:r>
+            <a:r>
+              <a:rPr lang="en-US" dirty="0"/>
+              <a:t> Web</a:t>
             </a:r>
           </a:p>
           <a:p>
@@ -5419,7 +5427,7 @@
         </p:blipFill>
         <p:spPr>
           <a:xfrm>
-            <a:off x="9246657" y="5162250"/>
+            <a:off x="9134690" y="4935166"/>
             <a:ext cx="2877249" cy="1598474"/>
           </a:xfrm>
           <a:prstGeom prst="rect">
@@ -7074,17 +7082,125 @@
         <p:spPr>
           <a:xfrm>
             <a:off x="684212" y="4487332"/>
-            <a:ext cx="2385559" cy="1507067"/>
+            <a:ext cx="6127135" cy="1507067"/>
           </a:xfrm>
         </p:spPr>
         <p:txBody>
-          <a:bodyPr/>
-          <a:lstStyle/>
-          <a:p>
+          <a:bodyPr>
+            <a:normAutofit/>
+          </a:bodyPr>
+          <a:lstStyle/>
+          <a:p>
+            <a:r>
+              <a:rPr lang="en-US" dirty="0"/>
+              <a:t>S</a:t>
+            </a:r>
+            <a:r>
+              <a:rPr lang="es-ES" dirty="0" err="1"/>
+              <a:t>istemas</a:t>
+            </a:r>
             <a:r>
               <a:rPr lang="es-ES" dirty="0"/>
-              <a:t>Fin</a:t>
-            </a:r>
+              <a:t> necesarios </a:t>
+            </a:r>
+          </a:p>
+        </p:txBody>
+      </p:sp>
+      <p:sp>
+        <p:nvSpPr>
+          <p:cNvPr id="3" name="CuadroTexto 2">
+            <a:extLst>
+              <a:ext uri="{FF2B5EF4-FFF2-40B4-BE49-F238E27FC236}">
+                <a16:creationId xmlns:a16="http://schemas.microsoft.com/office/drawing/2014/main" id="{FFB4E047-0438-A455-3787-3EC24E727677}"/>
+              </a:ext>
+            </a:extLst>
+          </p:cNvPr>
+          <p:cNvSpPr txBox="1"/>
+          <p:nvPr/>
+        </p:nvSpPr>
+        <p:spPr>
+          <a:xfrm>
+            <a:off x="1147665" y="1287624"/>
+            <a:ext cx="7856375" cy="1477328"/>
+          </a:xfrm>
+          <a:prstGeom prst="rect">
+            <a:avLst/>
+          </a:prstGeom>
+          <a:noFill/>
+        </p:spPr>
+        <p:txBody>
+          <a:bodyPr wrap="square" rtlCol="0">
+            <a:spAutoFit/>
+          </a:bodyPr>
+          <a:lstStyle/>
+          <a:p>
+            <a:pPr marL="285750" indent="-285750">
+              <a:buFont typeface="Arial" panose="020B0604020202020204" pitchFamily="34" charset="0"/>
+              <a:buChar char="•"/>
+            </a:pPr>
+            <a:r>
+              <a:rPr lang="en-US" dirty="0"/>
+              <a:t>Parte del </a:t>
+            </a:r>
+            <a:r>
+              <a:rPr lang="en-US" dirty="0" err="1"/>
+              <a:t>cliente</a:t>
+            </a:r>
+            <a:r>
+              <a:rPr lang="en-US" dirty="0"/>
+              <a:t> (Font-End) </a:t>
+            </a:r>
+          </a:p>
+          <a:p>
+            <a:pPr marL="285750" indent="-285750">
+              <a:buFont typeface="Arial" panose="020B0604020202020204" pitchFamily="34" charset="0"/>
+              <a:buChar char="•"/>
+            </a:pPr>
+            <a:endParaRPr lang="en-US" dirty="0"/>
+          </a:p>
+          <a:p>
+            <a:pPr marL="285750" indent="-285750">
+              <a:buFont typeface="Arial" panose="020B0604020202020204" pitchFamily="34" charset="0"/>
+              <a:buChar char="•"/>
+            </a:pPr>
+            <a:r>
+              <a:rPr lang="en-US" dirty="0"/>
+              <a:t>Parte del </a:t>
+            </a:r>
+            <a:r>
+              <a:rPr lang="en-US" dirty="0" err="1"/>
+              <a:t>servidor</a:t>
+            </a:r>
+            <a:r>
+              <a:rPr lang="en-US" dirty="0"/>
+              <a:t> (Back-End</a:t>
+            </a:r>
+            <a:r>
+              <a:rPr lang="es-ES" dirty="0"/>
+              <a:t>)</a:t>
+            </a:r>
+          </a:p>
+          <a:p>
+            <a:pPr marL="285750" indent="-285750">
+              <a:buFont typeface="Arial" panose="020B0604020202020204" pitchFamily="34" charset="0"/>
+              <a:buChar char="•"/>
+            </a:pPr>
+            <a:endParaRPr lang="es-ES" dirty="0"/>
+          </a:p>
+          <a:p>
+            <a:pPr marL="285750" indent="-285750">
+              <a:buFont typeface="Arial" panose="020B0604020202020204" pitchFamily="34" charset="0"/>
+              <a:buChar char="•"/>
+            </a:pPr>
+            <a:r>
+              <a:rPr lang="es-ES" dirty="0"/>
+              <a:t>Sistema de obtención de datos del </a:t>
+            </a:r>
+            <a:r>
+              <a:rPr lang="es-ES" dirty="0" err="1"/>
+              <a:t>vehiculo</a:t>
+            </a:r>
+            <a:endParaRPr lang="es-ES" dirty="0"/>
           </a:p>
         </p:txBody>
       </p:sp>

</xml_diff>